<commit_message>
Criando pasta de exercicios para sql.
</commit_message>
<xml_diff>
--- a/Material_Sala/BD_Mer_Der/backend-BD-MER-DER.pptx
+++ b/Material_Sala/BD_Mer_Der/backend-BD-MER-DER.pptx
@@ -8049,13 +8049,8 @@
             </a:r>
             <a:r>
               <a:rPr lang="pt-BR" dirty="0"/>
-              <a:t> , der no </a:t>
+              <a:t> , der</a:t>
             </a:r>
-            <a:r>
-              <a:rPr lang="pt-BR" dirty="0" err="1"/>
-              <a:t>php</a:t>
-            </a:r>
-            <a:endParaRPr lang="pt-BR" dirty="0"/>
           </a:p>
         </p:txBody>
       </p:sp>
@@ -8109,11 +8104,7 @@
             </a:br>
             <a:r>
               <a:rPr lang="pt-BR" b="1" dirty="0"/>
-              <a:t>Bruno </a:t>
-            </a:r>
-            <a:r>
-              <a:rPr lang="pt-BR" b="1" dirty="0" err="1"/>
-              <a:t>Cezarcio</a:t>
+              <a:t>Bruno Cezario</a:t>
             </a:r>
             <a:r>
               <a:rPr lang="pt-BR" sz="3000" dirty="0"/>

</xml_diff>